<commit_message>
some updates in ADRs, docu and list of sites
</commit_message>
<xml_diff>
--- a/documentation/canvas-status-arc42-org.pptx
+++ b/documentation/canvas-status-arc42-org.pptx
@@ -210,7 +210,7 @@
           <a:p>
             <a:fld id="{64B5F81B-5358-9847-9EB0-70E79DCD4415}" type="datetimeFigureOut">
               <a:rPr lang="de-DE" smtClean="0"/>
-              <a:t>05.01.24</a:t>
+              <a:t>20.06.24</a:t>
             </a:fld>
             <a:endParaRPr lang="de-DE"/>
           </a:p>
@@ -9989,7 +9989,7 @@
         </p:nvSpPr>
         <p:spPr>
           <a:xfrm rot="20108336">
-            <a:off x="2008566" y="2614669"/>
+            <a:off x="1440725" y="2590450"/>
             <a:ext cx="5317481" cy="1200329"/>
           </a:xfrm>
           <a:prstGeom prst="rect">

</xml_diff>